<commit_message>
embed MovieLens hyperlink to readme)
</commit_message>
<xml_diff>
--- a/MovieLens_Recommender_Presentation.pptx
+++ b/MovieLens_Recommender_Presentation.pptx
@@ -1930,7 +1930,7 @@
               <a:buNone/>
             </a:pPr>
             <a:r>
-              <a:rPr lang="en-US" sz="1400" dirty="0">
+              <a:rPr lang="en-US" dirty="0">
                 <a:solidFill>
                   <a:srgbClr val="334155"/>
                 </a:solidFill>
@@ -1940,7 +1940,7 @@
               </a:rPr>
               <a:t>Movie streaming platform product &amp; personalization team</a:t>
             </a:r>
-            <a:endParaRPr lang="en-US" sz="1400" dirty="0"/>
+            <a:endParaRPr lang="en-US" dirty="0"/>
           </a:p>
         </p:txBody>
       </p:sp>
@@ -2008,7 +2008,7 @@
               <a:buNone/>
             </a:pPr>
             <a:r>
-              <a:rPr lang="en-US" sz="1400" dirty="0">
+              <a:rPr lang="en-US" dirty="0">
                 <a:solidFill>
                   <a:srgbClr val="334155"/>
                 </a:solidFill>
@@ -2018,7 +2018,7 @@
               </a:rPr>
               <a:t>Users face choice overload. If they can't quickly find movies they'll enjoy, engagement drops and churn risk increases.</a:t>
             </a:r>
-            <a:endParaRPr lang="en-US" sz="1400" dirty="0"/>
+            <a:endParaRPr lang="en-US" dirty="0"/>
           </a:p>
         </p:txBody>
       </p:sp>
@@ -2086,7 +2086,7 @@
               <a:buNone/>
             </a:pPr>
             <a:r>
-              <a:rPr lang="en-US" sz="1400" dirty="0">
+              <a:rPr lang="en-US" dirty="0">
                 <a:solidFill>
                   <a:srgbClr val="334155"/>
                 </a:solidFill>
@@ -2096,7 +2096,7 @@
               </a:rPr>
               <a:t>Predict how a user would rate unseen movies and return Top-5 personalized recommendations.</a:t>
             </a:r>
-            <a:endParaRPr lang="en-US" sz="1400" dirty="0"/>
+            <a:endParaRPr lang="en-US" dirty="0"/>
           </a:p>
         </p:txBody>
       </p:sp>
@@ -2165,7 +2165,7 @@
               <a:buChar char="•"/>
             </a:pPr>
             <a:r>
-              <a:rPr lang="en-US" sz="1400" dirty="0">
+              <a:rPr lang="en-US" dirty="0">
                 <a:solidFill>
                   <a:srgbClr val="334155"/>
                 </a:solidFill>
@@ -2175,7 +2175,7 @@
               </a:rPr>
               <a:t> “Recommended for You” row on homepage</a:t>
             </a:r>
-            <a:endParaRPr lang="en-US" sz="1400" dirty="0"/>
+            <a:endParaRPr lang="en-US" dirty="0"/>
           </a:p>
           <a:p>
             <a:pPr marL="228600" indent="-228600">
@@ -2183,7 +2183,7 @@
               <a:buChar char="•"/>
             </a:pPr>
             <a:r>
-              <a:rPr lang="en-US" sz="1400" dirty="0">
+              <a:rPr lang="en-US" dirty="0">
                 <a:solidFill>
                   <a:srgbClr val="334155"/>
                 </a:solidFill>
@@ -2193,7 +2193,7 @@
               </a:rPr>
               <a:t> Email/push recommendation campaigns</a:t>
             </a:r>
-            <a:endParaRPr lang="en-US" sz="1400" dirty="0"/>
+            <a:endParaRPr lang="en-US" dirty="0"/>
           </a:p>
           <a:p>
             <a:pPr marL="228600" indent="-228600">
@@ -2201,7 +2201,7 @@
               <a:buChar char="•"/>
             </a:pPr>
             <a:r>
-              <a:rPr lang="en-US" sz="1400" dirty="0">
+              <a:rPr lang="en-US" dirty="0">
                 <a:solidFill>
                   <a:srgbClr val="334155"/>
                 </a:solidFill>
@@ -2211,7 +2211,7 @@
               </a:rPr>
               <a:t> Content discovery and retention initiatives</a:t>
             </a:r>
-            <a:endParaRPr lang="en-US" sz="1400" dirty="0"/>
+            <a:endParaRPr lang="en-US" dirty="0"/>
           </a:p>
         </p:txBody>
       </p:sp>
@@ -2442,7 +2442,7 @@
               <a:buNone/>
             </a:pPr>
             <a:r>
-              <a:rPr lang="en-US" sz="1400" dirty="0">
+              <a:rPr lang="en-US" dirty="0">
                 <a:solidFill>
                   <a:srgbClr val="334155"/>
                 </a:solidFill>
@@ -2452,14 +2452,14 @@
               </a:rPr>
               <a:t>MovieLens “latest small” (GroupLens)</a:t>
             </a:r>
-            <a:endParaRPr lang="en-US" sz="1400" dirty="0"/>
+            <a:endParaRPr lang="en-US" dirty="0"/>
           </a:p>
           <a:p>
             <a:pPr marL="0" indent="0">
               <a:buNone/>
             </a:pPr>
             <a:r>
-              <a:rPr lang="en-US" sz="1400" dirty="0">
+              <a:rPr lang="en-US" dirty="0">
                 <a:solidFill>
                   <a:srgbClr val="334155"/>
                 </a:solidFill>
@@ -2469,7 +2469,7 @@
               </a:rPr>
               <a:t>Explicit ratings on a 0.5–5.0 scale</a:t>
             </a:r>
-            <a:endParaRPr lang="en-US" sz="1400" dirty="0"/>
+            <a:endParaRPr lang="en-US" dirty="0"/>
           </a:p>
         </p:txBody>
       </p:sp>
@@ -2538,7 +2538,7 @@
               <a:buChar char="•"/>
             </a:pPr>
             <a:r>
-              <a:rPr lang="en-US" sz="1400" dirty="0">
+              <a:rPr lang="en-US" dirty="0">
                 <a:solidFill>
                   <a:srgbClr val="334155"/>
                 </a:solidFill>
@@ -2548,7 +2548,7 @@
               </a:rPr>
               <a:t> 100,836 ratings</a:t>
             </a:r>
-            <a:endParaRPr lang="en-US" sz="1400" dirty="0"/>
+            <a:endParaRPr lang="en-US" dirty="0"/>
           </a:p>
           <a:p>
             <a:pPr marL="228600" indent="-228600">
@@ -2556,7 +2556,7 @@
               <a:buChar char="•"/>
             </a:pPr>
             <a:r>
-              <a:rPr lang="en-US" sz="1400" dirty="0">
+              <a:rPr lang="en-US" dirty="0">
                 <a:solidFill>
                   <a:srgbClr val="334155"/>
                 </a:solidFill>
@@ -2566,7 +2566,7 @@
               </a:rPr>
               <a:t> 610 users</a:t>
             </a:r>
-            <a:endParaRPr lang="en-US" sz="1400" dirty="0"/>
+            <a:endParaRPr lang="en-US" dirty="0"/>
           </a:p>
           <a:p>
             <a:pPr marL="228600" indent="-228600">
@@ -2574,7 +2574,7 @@
               <a:buChar char="•"/>
             </a:pPr>
             <a:r>
-              <a:rPr lang="en-US" sz="1400" dirty="0">
+              <a:rPr lang="en-US" dirty="0">
                 <a:solidFill>
                   <a:srgbClr val="334155"/>
                 </a:solidFill>
@@ -2584,7 +2584,7 @@
               </a:rPr>
               <a:t> 9,742 movies</a:t>
             </a:r>
-            <a:endParaRPr lang="en-US" sz="1400" dirty="0"/>
+            <a:endParaRPr lang="en-US" dirty="0"/>
           </a:p>
           <a:p>
             <a:pPr marL="228600" indent="-228600">
@@ -2592,7 +2592,7 @@
               <a:buChar char="•"/>
             </a:pPr>
             <a:r>
-              <a:rPr lang="en-US" sz="1400" dirty="0">
+              <a:rPr lang="en-US" dirty="0">
                 <a:solidFill>
                   <a:srgbClr val="334155"/>
                 </a:solidFill>
@@ -2602,7 +2602,7 @@
               </a:rPr>
               <a:t> 3,683 tag applications</a:t>
             </a:r>
-            <a:endParaRPr lang="en-US" sz="1400" dirty="0"/>
+            <a:endParaRPr lang="en-US" dirty="0"/>
           </a:p>
         </p:txBody>
       </p:sp>
@@ -2670,7 +2670,7 @@
               <a:buNone/>
             </a:pPr>
             <a:r>
-              <a:rPr lang="en-US" sz="1400" dirty="0">
+              <a:rPr lang="en-US" dirty="0">
                 <a:solidFill>
                   <a:srgbClr val="334155"/>
                 </a:solidFill>
@@ -2680,7 +2680,7 @@
               </a:rPr>
               <a:t>The user–movie matrix is ~98.3% sparse. Sparsity makes similarity-based methods harder and motivates matrix factorization.</a:t>
             </a:r>
-            <a:endParaRPr lang="en-US" sz="1400" dirty="0"/>
+            <a:endParaRPr lang="en-US" dirty="0"/>
           </a:p>
         </p:txBody>
       </p:sp>
@@ -2741,7 +2741,7 @@
               <a:buNone/>
             </a:pPr>
             <a:r>
-              <a:rPr lang="en-US" sz="2000" b="1" dirty="0">
+              <a:rPr lang="en-US" sz="2400" b="1" dirty="0">
                 <a:solidFill>
                   <a:srgbClr val="0F172A"/>
                 </a:solidFill>
@@ -2751,7 +2751,7 @@
               </a:rPr>
               <a:t>Sparsity</a:t>
             </a:r>
-            <a:endParaRPr lang="en-US" sz="2000" dirty="0"/>
+            <a:endParaRPr lang="en-US" sz="2400" dirty="0"/>
           </a:p>
         </p:txBody>
       </p:sp>
@@ -2819,7 +2819,7 @@
               <a:buNone/>
             </a:pPr>
             <a:r>
-              <a:rPr lang="en-US" sz="1200" dirty="0">
+              <a:rPr lang="en-US" dirty="0">
                 <a:solidFill>
                   <a:srgbClr val="334155"/>
                 </a:solidFill>
@@ -2829,7 +2829,7 @@
               </a:rPr>
               <a:t>Only ~1.7% of user×movie pairs have ratings</a:t>
             </a:r>
-            <a:endParaRPr lang="en-US" sz="1200" dirty="0"/>
+            <a:endParaRPr lang="en-US" dirty="0"/>
           </a:p>
         </p:txBody>
       </p:sp>
@@ -2858,7 +2858,7 @@
               <a:buNone/>
             </a:pPr>
             <a:r>
-              <a:rPr lang="en-US" sz="1600" b="1" dirty="0">
+              <a:rPr lang="en-US" sz="2400" b="1" dirty="0">
                 <a:solidFill>
                   <a:srgbClr val="0F172A"/>
                 </a:solidFill>
@@ -2868,7 +2868,7 @@
               </a:rPr>
               <a:t>Limitations</a:t>
             </a:r>
-            <a:endParaRPr lang="en-US" sz="1600" dirty="0"/>
+            <a:endParaRPr lang="en-US" sz="2400" dirty="0"/>
           </a:p>
         </p:txBody>
       </p:sp>
@@ -2881,7 +2881,7 @@
         <p:spPr>
           <a:xfrm>
             <a:off x="7863840" y="3749040"/>
-            <a:ext cx="3291840" cy="914400"/>
+            <a:ext cx="3505200" cy="914400"/>
           </a:xfrm>
           <a:prstGeom prst="rect">
             <a:avLst/>
@@ -2898,7 +2898,7 @@
               <a:buChar char="•"/>
             </a:pPr>
             <a:r>
-              <a:rPr lang="en-US" sz="1200" dirty="0">
+              <a:rPr lang="en-US" dirty="0">
                 <a:solidFill>
                   <a:srgbClr val="334155"/>
                 </a:solidFill>
@@ -2908,7 +2908,7 @@
               </a:rPr>
               <a:t> Cold start for new users/movies</a:t>
             </a:r>
-            <a:endParaRPr lang="en-US" sz="1200" dirty="0"/>
+            <a:endParaRPr lang="en-US" dirty="0"/>
           </a:p>
           <a:p>
             <a:pPr marL="203200" indent="-203200">
@@ -2916,7 +2916,7 @@
               <a:buChar char="•"/>
             </a:pPr>
             <a:r>
-              <a:rPr lang="en-US" sz="1200" dirty="0">
+              <a:rPr lang="en-US" dirty="0">
                 <a:solidFill>
                   <a:srgbClr val="334155"/>
                 </a:solidFill>
@@ -2926,7 +2926,7 @@
               </a:rPr>
               <a:t> No demographics</a:t>
             </a:r>
-            <a:endParaRPr lang="en-US" sz="1200" dirty="0"/>
+            <a:endParaRPr lang="en-US" dirty="0"/>
           </a:p>
           <a:p>
             <a:pPr marL="203200" indent="-203200">
@@ -2934,7 +2934,7 @@
               <a:buChar char="•"/>
             </a:pPr>
             <a:r>
-              <a:rPr lang="en-US" sz="1200" dirty="0">
+              <a:rPr lang="en-US" dirty="0">
                 <a:solidFill>
                   <a:srgbClr val="334155"/>
                 </a:solidFill>
@@ -2944,7 +2944,7 @@
               </a:rPr>
               <a:t> Offline error ≠ business KPIs</a:t>
             </a:r>
-            <a:endParaRPr lang="en-US" sz="1200" dirty="0"/>
+            <a:endParaRPr lang="en-US" dirty="0"/>
           </a:p>
         </p:txBody>
       </p:sp>
@@ -3136,7 +3136,7 @@
               <a:buNone/>
             </a:pPr>
             <a:r>
-              <a:rPr lang="en-US" sz="2000" b="1" dirty="0">
+              <a:rPr lang="en-US" sz="2400" b="1" dirty="0">
                 <a:solidFill>
                   <a:srgbClr val="0F172A"/>
                 </a:solidFill>
@@ -3146,7 +3146,7 @@
               </a:rPr>
               <a:t>Rating distribution (explicit feedback)</a:t>
             </a:r>
-            <a:endParaRPr lang="en-US" sz="2000" dirty="0"/>
+            <a:endParaRPr lang="en-US" sz="2400" dirty="0"/>
           </a:p>
         </p:txBody>
       </p:sp>
@@ -3182,8 +3182,8 @@
         </p:nvSpPr>
         <p:spPr>
           <a:xfrm>
-            <a:off x="1097280" y="5989320"/>
-            <a:ext cx="10058400" cy="320040"/>
+            <a:off x="2621280" y="5989320"/>
+            <a:ext cx="7229632" cy="320040"/>
           </a:xfrm>
           <a:prstGeom prst="rect">
             <a:avLst/>
@@ -3487,8 +3487,8 @@
         </p:nvSpPr>
         <p:spPr>
           <a:xfrm>
-            <a:off x="1280160" y="2514600"/>
-            <a:ext cx="2011680" cy="365760"/>
+            <a:off x="1118672" y="2514600"/>
+            <a:ext cx="2356048" cy="365760"/>
           </a:xfrm>
           <a:prstGeom prst="rect">
             <a:avLst/>
@@ -3504,7 +3504,7 @@
               <a:buNone/>
             </a:pPr>
             <a:r>
-              <a:rPr lang="en-US" sz="1100" dirty="0">
+              <a:rPr lang="en-US" sz="1400" dirty="0">
                 <a:solidFill>
                   <a:srgbClr val="334155"/>
                 </a:solidFill>
@@ -3514,7 +3514,7 @@
               </a:rPr>
               <a:t>Global + user + movie biases</a:t>
             </a:r>
-            <a:endParaRPr lang="en-US" sz="1100" dirty="0"/>
+            <a:endParaRPr lang="en-US" sz="1400" dirty="0"/>
           </a:p>
         </p:txBody>
       </p:sp>
@@ -3632,7 +3632,7 @@
               <a:buNone/>
             </a:pPr>
             <a:r>
-              <a:rPr lang="en-US" sz="1100" dirty="0">
+              <a:rPr lang="en-US" sz="1400" dirty="0">
                 <a:solidFill>
                   <a:srgbClr val="334155"/>
                 </a:solidFill>
@@ -3642,7 +3642,7 @@
               </a:rPr>
               <a:t>Item-item similarity</a:t>
             </a:r>
-            <a:endParaRPr lang="en-US" sz="1100" dirty="0"/>
+            <a:endParaRPr lang="en-US" sz="1400" dirty="0"/>
           </a:p>
         </p:txBody>
       </p:sp>
@@ -3760,7 +3760,7 @@
               <a:buNone/>
             </a:pPr>
             <a:r>
-              <a:rPr lang="en-US" sz="1100" dirty="0">
+              <a:rPr lang="en-US" sz="1400" dirty="0">
                 <a:solidFill>
                   <a:srgbClr val="334155"/>
                 </a:solidFill>
@@ -3770,7 +3770,7 @@
               </a:rPr>
               <a:t>Latent factors</a:t>
             </a:r>
-            <a:endParaRPr lang="en-US" sz="1100" dirty="0"/>
+            <a:endParaRPr lang="en-US" sz="1400" dirty="0"/>
           </a:p>
         </p:txBody>
       </p:sp>
@@ -3888,7 +3888,7 @@
               <a:buNone/>
             </a:pPr>
             <a:r>
-              <a:rPr lang="en-US" sz="1100" dirty="0">
+              <a:rPr lang="en-US" sz="1400" dirty="0">
                 <a:solidFill>
                   <a:srgbClr val="E2E8F0"/>
                 </a:solidFill>
@@ -3898,7 +3898,7 @@
               </a:rPr>
               <a:t>GridSearchCV (CV)</a:t>
             </a:r>
-            <a:endParaRPr lang="en-US" sz="1100" dirty="0"/>
+            <a:endParaRPr lang="en-US" sz="1400" dirty="0"/>
           </a:p>
         </p:txBody>
       </p:sp>
@@ -3966,7 +3966,7 @@
               <a:buNone/>
             </a:pPr>
             <a:r>
-              <a:rPr lang="en-US" sz="1600" b="1" dirty="0">
+              <a:rPr lang="en-US" sz="2400" b="1" dirty="0">
                 <a:solidFill>
                   <a:srgbClr val="0F172A"/>
                 </a:solidFill>
@@ -3976,7 +3976,7 @@
               </a:rPr>
               <a:t>Evaluation plan</a:t>
             </a:r>
-            <a:endParaRPr lang="en-US" sz="1600" dirty="0"/>
+            <a:endParaRPr lang="en-US" sz="2400" dirty="0"/>
           </a:p>
         </p:txBody>
       </p:sp>
@@ -4006,7 +4006,7 @@
               <a:buChar char="•"/>
             </a:pPr>
             <a:r>
-              <a:rPr lang="en-US" sz="1400" dirty="0">
+              <a:rPr lang="en-US" dirty="0">
                 <a:solidFill>
                   <a:srgbClr val="334155"/>
                 </a:solidFill>
@@ -4016,7 +4016,7 @@
               </a:rPr>
               <a:t>80/20 split (holdout test)</a:t>
             </a:r>
-            <a:endParaRPr lang="en-US" sz="1400" dirty="0"/>
+            <a:endParaRPr lang="en-US" dirty="0"/>
           </a:p>
           <a:p>
             <a:pPr marL="228600" indent="-228600">
@@ -4024,7 +4024,7 @@
               <a:buChar char="•"/>
             </a:pPr>
             <a:r>
-              <a:rPr lang="en-US" sz="1400" dirty="0">
+              <a:rPr lang="en-US" dirty="0">
                 <a:solidFill>
                   <a:srgbClr val="334155"/>
                 </a:solidFill>
@@ -4034,7 +4034,7 @@
               </a:rPr>
               <a:t>3-fold CV on train for model selection</a:t>
             </a:r>
-            <a:endParaRPr lang="en-US" sz="1400" dirty="0"/>
+            <a:endParaRPr lang="en-US" dirty="0"/>
           </a:p>
           <a:p>
             <a:pPr marL="228600" indent="-228600">
@@ -4042,7 +4042,7 @@
               <a:buChar char="•"/>
             </a:pPr>
             <a:r>
-              <a:rPr lang="en-US" sz="1400" dirty="0">
+              <a:rPr lang="en-US" dirty="0">
                 <a:solidFill>
                   <a:srgbClr val="334155"/>
                 </a:solidFill>
@@ -4052,7 +4052,7 @@
               </a:rPr>
               <a:t>Metrics: RMSE + MAE (error in “stars”)</a:t>
             </a:r>
-            <a:endParaRPr lang="en-US" sz="1400" dirty="0"/>
+            <a:endParaRPr lang="en-US" dirty="0"/>
           </a:p>
         </p:txBody>
       </p:sp>
@@ -4172,7 +4172,7 @@
               <a:buNone/>
             </a:pPr>
             <a:r>
-              <a:rPr lang="en-US" sz="2000" b="1" dirty="0">
+              <a:rPr lang="en-US" sz="2800" b="1" dirty="0">
                 <a:solidFill>
                   <a:srgbClr val="FFFFFF"/>
                 </a:solidFill>
@@ -4182,7 +4182,7 @@
               </a:rPr>
               <a:t>Results</a:t>
             </a:r>
-            <a:endParaRPr lang="en-US" sz="2000" dirty="0"/>
+            <a:endParaRPr lang="en-US" sz="2800" dirty="0"/>
           </a:p>
         </p:txBody>
       </p:sp>
@@ -4195,7 +4195,7 @@
         <p:spPr>
           <a:xfrm>
             <a:off x="822960" y="1097280"/>
-            <a:ext cx="10607040" cy="5212080"/>
+            <a:ext cx="10607040" cy="5614416"/>
           </a:xfrm>
           <a:prstGeom prst="roundRect">
             <a:avLst/>
@@ -4221,7 +4221,7 @@
           <a:bodyPr/>
           <a:lstStyle/>
           <a:p>
-            <a:endParaRPr/>
+            <a:endParaRPr dirty="0"/>
           </a:p>
         </p:txBody>
       </p:sp>
@@ -4250,7 +4250,7 @@
               <a:buNone/>
             </a:pPr>
             <a:r>
-              <a:rPr lang="en-US" sz="1600" b="1" dirty="0">
+              <a:rPr lang="en-US" sz="2400" b="1" dirty="0">
                 <a:solidFill>
                   <a:srgbClr val="0F172A"/>
                 </a:solidFill>
@@ -4260,7 +4260,7 @@
               </a:rPr>
               <a:t>Model performance (lower is better)</a:t>
             </a:r>
-            <a:endParaRPr lang="en-US" sz="1600" dirty="0"/>
+            <a:endParaRPr lang="en-US" sz="2400" dirty="0"/>
           </a:p>
         </p:txBody>
       </p:sp>
@@ -4272,7 +4272,7 @@
         </p:nvSpPr>
         <p:spPr>
           <a:xfrm>
-            <a:off x="1097280" y="5715000"/>
+            <a:off x="1097280" y="5312664"/>
             <a:ext cx="10058400" cy="274320"/>
           </a:xfrm>
           <a:prstGeom prst="rect">
@@ -4311,8 +4311,8 @@
         </p:nvSpPr>
         <p:spPr>
           <a:xfrm>
-            <a:off x="1097280" y="5989320"/>
-            <a:ext cx="10058400" cy="777240"/>
+            <a:off x="1400961" y="5620405"/>
+            <a:ext cx="9754719" cy="777240"/>
           </a:xfrm>
           <a:prstGeom prst="rect">
             <a:avLst/>
@@ -4329,7 +4329,7 @@
               <a:buChar char="•"/>
             </a:pPr>
             <a:r>
-              <a:rPr lang="en-US" sz="1200" dirty="0">
+              <a:rPr lang="en-US" dirty="0">
                 <a:solidFill>
                   <a:srgbClr val="334155"/>
                 </a:solidFill>
@@ -4339,7 +4339,7 @@
               </a:rPr>
               <a:t> Baseline is strong (bias effects explain much of rating behavior)</a:t>
             </a:r>
-            <a:endParaRPr lang="en-US" sz="1200" dirty="0"/>
+            <a:endParaRPr lang="en-US" dirty="0"/>
           </a:p>
           <a:p>
             <a:pPr marL="203200" indent="-203200">
@@ -4347,7 +4347,7 @@
               <a:buChar char="•"/>
             </a:pPr>
             <a:r>
-              <a:rPr lang="en-US" sz="1200" dirty="0">
+              <a:rPr lang="en-US" dirty="0">
                 <a:solidFill>
                   <a:srgbClr val="334155"/>
                 </a:solidFill>
@@ -4357,7 +4357,7 @@
               </a:rPr>
               <a:t> Tuning makes SVD competitive and stable on holdout (CV ≈ Test)</a:t>
             </a:r>
-            <a:endParaRPr lang="en-US" sz="1200" dirty="0"/>
+            <a:endParaRPr lang="en-US" dirty="0"/>
           </a:p>
           <a:p>
             <a:pPr marL="203200" indent="-203200">
@@ -4365,7 +4365,7 @@
               <a:buChar char="•"/>
             </a:pPr>
             <a:r>
-              <a:rPr lang="en-US" sz="1200" dirty="0">
+              <a:rPr lang="en-US" dirty="0">
                 <a:solidFill>
                   <a:srgbClr val="334155"/>
                 </a:solidFill>
@@ -4375,7 +4375,7 @@
               </a:rPr>
               <a:t> RMSE ≈ 0.88 ⇒ typical error ~0.9 stars on a 0.5–5 scale</a:t>
             </a:r>
-            <a:endParaRPr lang="en-US" sz="1200" dirty="0"/>
+            <a:endParaRPr lang="en-US" dirty="0"/>
           </a:p>
         </p:txBody>
       </p:sp>
@@ -4451,7 +4451,7 @@
         <p:spPr>
           <a:xfrm>
             <a:off x="2489775" y="5669280"/>
-            <a:ext cx="7273410" cy="320040"/>
+            <a:ext cx="184731" cy="276999"/>
           </a:xfrm>
           <a:prstGeom prst="rect">
             <a:avLst/>
@@ -4471,7 +4471,47 @@
                 </a:solidFill>
               </a:defRPr>
             </a:pPr>
-            <a:r>
+            <a:endParaRPr dirty="0"/>
+          </a:p>
+        </p:txBody>
+      </p:sp>
+      <p:sp>
+        <p:nvSpPr>
+          <p:cNvPr id="12" name="TextBox 11">
+            <a:extLst>
+              <a:ext uri="{FF2B5EF4-FFF2-40B4-BE49-F238E27FC236}">
+                <a16:creationId xmlns:a16="http://schemas.microsoft.com/office/drawing/2014/main" id="{9B408BEC-0549-2235-8947-1115ECBE4F8A}"/>
+              </a:ext>
+            </a:extLst>
+          </p:cNvPr>
+          <p:cNvSpPr txBox="1"/>
+          <p:nvPr/>
+        </p:nvSpPr>
+        <p:spPr>
+          <a:xfrm>
+            <a:off x="2489775" y="6416171"/>
+            <a:ext cx="7919208" cy="307777"/>
+          </a:xfrm>
+          <a:prstGeom prst="rect">
+            <a:avLst/>
+          </a:prstGeom>
+          <a:noFill/>
+        </p:spPr>
+        <p:txBody>
+          <a:bodyPr wrap="square">
+            <a:spAutoFit/>
+          </a:bodyPr>
+          <a:lstStyle/>
+          <a:p>
+            <a:pPr>
+              <a:defRPr sz="1200">
+                <a:solidFill>
+                  <a:srgbClr val="5A5A5A"/>
+                </a:solidFill>
+              </a:defRPr>
+            </a:pPr>
+            <a:r>
+              <a:rPr lang="en-US" sz="1400" dirty="0"/>
               <a:t>Note: RMSE and MAE use separate (zoomed) y-axes so small differences are easier to see. Lower is better.</a:t>
             </a:r>
           </a:p>

</xml_diff>